<commit_message>
Update from the master branch
</commit_message>
<xml_diff>
--- a/기획서/신버전/레벨 기획.pptx
+++ b/기획서/신버전/레벨 기획.pptx
@@ -214,7 +214,7 @@
           <a:p>
             <a:fld id="{D686C50E-113A-4B4A-8A5C-9EE1E9DBA064}" type="datetimeFigureOut">
               <a:rPr lang="ko-KR" altLang="en-US" smtClean="0"/>
-              <a:t>2021-05-01</a:t>
+              <a:t>2021-05-21</a:t>
             </a:fld>
             <a:endParaRPr lang="ko-KR" altLang="en-US" dirty="0"/>
           </a:p>
@@ -391,7 +391,7 @@
           <a:p>
             <a:fld id="{40EC3B2E-CA71-40FC-A78E-FA212ABD0BB7}" type="datetimeFigureOut">
               <a:rPr lang="ko-KR" altLang="en-US" smtClean="0"/>
-              <a:t>2021-05-01</a:t>
+              <a:t>2021-05-21</a:t>
             </a:fld>
             <a:endParaRPr lang="ko-KR" altLang="en-US" dirty="0"/>
           </a:p>
@@ -789,7 +789,7 @@
           <a:p>
             <a:fld id="{F8CAAD71-D53C-4447-AAA3-BC9075A67E69}" type="datetimeFigureOut">
               <a:rPr lang="ko-KR" altLang="en-US" smtClean="0"/>
-              <a:t>2021-05-01</a:t>
+              <a:t>2021-05-21</a:t>
             </a:fld>
             <a:endParaRPr lang="ko-KR" altLang="en-US" dirty="0"/>
           </a:p>
@@ -959,7 +959,7 @@
           <a:p>
             <a:fld id="{F8CAAD71-D53C-4447-AAA3-BC9075A67E69}" type="datetimeFigureOut">
               <a:rPr lang="ko-KR" altLang="en-US" smtClean="0"/>
-              <a:t>2021-05-01</a:t>
+              <a:t>2021-05-21</a:t>
             </a:fld>
             <a:endParaRPr lang="ko-KR" altLang="en-US" dirty="0"/>
           </a:p>
@@ -1139,7 +1139,7 @@
           <a:p>
             <a:fld id="{F8CAAD71-D53C-4447-AAA3-BC9075A67E69}" type="datetimeFigureOut">
               <a:rPr lang="ko-KR" altLang="en-US" smtClean="0"/>
-              <a:t>2021-05-01</a:t>
+              <a:t>2021-05-21</a:t>
             </a:fld>
             <a:endParaRPr lang="ko-KR" altLang="en-US" dirty="0"/>
           </a:p>
@@ -1309,7 +1309,7 @@
           <a:p>
             <a:fld id="{F8CAAD71-D53C-4447-AAA3-BC9075A67E69}" type="datetimeFigureOut">
               <a:rPr lang="ko-KR" altLang="en-US" smtClean="0"/>
-              <a:t>2021-05-01</a:t>
+              <a:t>2021-05-21</a:t>
             </a:fld>
             <a:endParaRPr lang="ko-KR" altLang="en-US" dirty="0"/>
           </a:p>
@@ -1555,7 +1555,7 @@
           <a:p>
             <a:fld id="{F8CAAD71-D53C-4447-AAA3-BC9075A67E69}" type="datetimeFigureOut">
               <a:rPr lang="ko-KR" altLang="en-US" smtClean="0"/>
-              <a:t>2021-05-01</a:t>
+              <a:t>2021-05-21</a:t>
             </a:fld>
             <a:endParaRPr lang="ko-KR" altLang="en-US" dirty="0"/>
           </a:p>
@@ -1787,7 +1787,7 @@
           <a:p>
             <a:fld id="{F8CAAD71-D53C-4447-AAA3-BC9075A67E69}" type="datetimeFigureOut">
               <a:rPr lang="ko-KR" altLang="en-US" smtClean="0"/>
-              <a:t>2021-05-01</a:t>
+              <a:t>2021-05-21</a:t>
             </a:fld>
             <a:endParaRPr lang="ko-KR" altLang="en-US" dirty="0"/>
           </a:p>
@@ -2154,7 +2154,7 @@
           <a:p>
             <a:fld id="{F8CAAD71-D53C-4447-AAA3-BC9075A67E69}" type="datetimeFigureOut">
               <a:rPr lang="ko-KR" altLang="en-US" smtClean="0"/>
-              <a:t>2021-05-01</a:t>
+              <a:t>2021-05-21</a:t>
             </a:fld>
             <a:endParaRPr lang="ko-KR" altLang="en-US" dirty="0"/>
           </a:p>
@@ -2272,7 +2272,7 @@
           <a:p>
             <a:fld id="{F8CAAD71-D53C-4447-AAA3-BC9075A67E69}" type="datetimeFigureOut">
               <a:rPr lang="ko-KR" altLang="en-US" smtClean="0"/>
-              <a:t>2021-05-01</a:t>
+              <a:t>2021-05-21</a:t>
             </a:fld>
             <a:endParaRPr lang="ko-KR" altLang="en-US" dirty="0"/>
           </a:p>
@@ -2367,7 +2367,7 @@
           <a:p>
             <a:fld id="{F8CAAD71-D53C-4447-AAA3-BC9075A67E69}" type="datetimeFigureOut">
               <a:rPr lang="ko-KR" altLang="en-US" smtClean="0"/>
-              <a:t>2021-05-01</a:t>
+              <a:t>2021-05-21</a:t>
             </a:fld>
             <a:endParaRPr lang="ko-KR" altLang="en-US" dirty="0"/>
           </a:p>
@@ -2644,7 +2644,7 @@
           <a:p>
             <a:fld id="{F8CAAD71-D53C-4447-AAA3-BC9075A67E69}" type="datetimeFigureOut">
               <a:rPr lang="ko-KR" altLang="en-US" smtClean="0"/>
-              <a:t>2021-05-01</a:t>
+              <a:t>2021-05-21</a:t>
             </a:fld>
             <a:endParaRPr lang="ko-KR" altLang="en-US" dirty="0"/>
           </a:p>
@@ -2901,7 +2901,7 @@
           <a:p>
             <a:fld id="{F8CAAD71-D53C-4447-AAA3-BC9075A67E69}" type="datetimeFigureOut">
               <a:rPr lang="ko-KR" altLang="en-US" smtClean="0"/>
-              <a:t>2021-05-01</a:t>
+              <a:t>2021-05-21</a:t>
             </a:fld>
             <a:endParaRPr lang="ko-KR" altLang="en-US" dirty="0"/>
           </a:p>
@@ -3119,7 +3119,7 @@
           <a:p>
             <a:fld id="{F8CAAD71-D53C-4447-AAA3-BC9075A67E69}" type="datetimeFigureOut">
               <a:rPr lang="ko-KR" altLang="en-US" smtClean="0"/>
-              <a:t>2021-05-01</a:t>
+              <a:t>2021-05-21</a:t>
             </a:fld>
             <a:endParaRPr lang="ko-KR" altLang="en-US" dirty="0"/>
           </a:p>
@@ -3576,22 +3576,15 @@
           <a:p>
             <a:pPr algn="ctr"/>
             <a:r>
-              <a:rPr lang="en-US" altLang="ko-KR" sz="2401" dirty="0">
+              <a:rPr lang="ko-KR" altLang="en-US" sz="2401" dirty="0">
                 <a:solidFill>
                   <a:schemeClr val="accent4"/>
                 </a:solidFill>
                 <a:latin typeface="휴먼모음T" panose="02030504000101010101" pitchFamily="18" charset="-127"/>
                 <a:ea typeface="휴먼모음T" panose="02030504000101010101" pitchFamily="18" charset="-127"/>
               </a:rPr>
-              <a:t>UI</a:t>
-            </a:r>
-            <a:endParaRPr lang="ko-KR" altLang="en-US" sz="2401" dirty="0">
-              <a:solidFill>
-                <a:schemeClr val="accent4"/>
-              </a:solidFill>
-              <a:latin typeface="휴먼모음T" panose="02030504000101010101" pitchFamily="18" charset="-127"/>
-              <a:ea typeface="휴먼모음T" panose="02030504000101010101" pitchFamily="18" charset="-127"/>
-            </a:endParaRPr>
+              <a:t>레벨</a:t>
+            </a:r>
           </a:p>
         </p:txBody>
       </p:sp>
@@ -4002,21 +3995,7 @@
                 <a:latin typeface="메이플스토리" panose="02000300000000000000" pitchFamily="2" charset="-127"/>
                 <a:ea typeface="메이플스토리" panose="02000300000000000000" pitchFamily="2" charset="-127"/>
               </a:rPr>
-              <a:t>1(</a:t>
-            </a:r>
-            <a:r>
-              <a:rPr lang="ko-KR" altLang="en-US" b="1" dirty="0">
-                <a:latin typeface="메이플스토리" panose="02000300000000000000" pitchFamily="2" charset="-127"/>
-                <a:ea typeface="메이플스토리" panose="02000300000000000000" pitchFamily="2" charset="-127"/>
-              </a:rPr>
-              <a:t>튜토리얼</a:t>
-            </a:r>
-            <a:r>
-              <a:rPr lang="en-US" altLang="ko-KR" b="1" dirty="0">
-                <a:latin typeface="메이플스토리" panose="02000300000000000000" pitchFamily="2" charset="-127"/>
-                <a:ea typeface="메이플스토리" panose="02000300000000000000" pitchFamily="2" charset="-127"/>
-              </a:rPr>
-              <a:t>)</a:t>
+              <a:t>1</a:t>
             </a:r>
             <a:endParaRPr lang="ko-KR" altLang="en-US" b="1" dirty="0">
               <a:latin typeface="메이플스토리" panose="02000300000000000000" pitchFamily="2" charset="-127"/>

</xml_diff>